<commit_message>
Add housing locations heatmap image
</commit_message>
<xml_diff>
--- a/airbnb_new_york.pptx
+++ b/airbnb_new_york.pptx
@@ -126,6 +126,11 @@
       </a:defRPr>
     </a:lvl9pPr>
   </p:defaultTextStyle>
+  <p:extLst>
+    <p:ext uri="{EFAFB233-063F-42B5-8137-9DF3F51BA10A}">
+      <p15:sldGuideLst xmlns:p15="http://schemas.microsoft.com/office/powerpoint/2012/main"/>
+    </p:ext>
+  </p:extLst>
 </p:presentation>
 </file>
 
@@ -299,7 +304,7 @@
             <a:fld id="{87DE6118-2437-4B30-8E3C-4D2BE6020583}" type="datetimeFigureOut">
               <a:rPr lang="en-US" dirty="0"/>
               <a:pPr/>
-              <a:t>11/22/19</a:t>
+              <a:t>12/2/19</a:t>
             </a:fld>
             <a:endParaRPr lang="en-US" dirty="0"/>
           </a:p>
@@ -625,7 +630,7 @@
           <a:p>
             <a:fld id="{87DE6118-2437-4B30-8E3C-4D2BE6020583}" type="datetimeFigureOut">
               <a:rPr lang="en-US" dirty="0"/>
-              <a:t>11/22/19</a:t>
+              <a:t>12/2/19</a:t>
             </a:fld>
             <a:endParaRPr lang="en-US" dirty="0"/>
           </a:p>
@@ -800,7 +805,7 @@
           <a:p>
             <a:fld id="{87DE6118-2437-4B30-8E3C-4D2BE6020583}" type="datetimeFigureOut">
               <a:rPr lang="en-US" dirty="0"/>
-              <a:t>11/22/19</a:t>
+              <a:t>12/2/19</a:t>
             </a:fld>
             <a:endParaRPr lang="en-US" dirty="0"/>
           </a:p>
@@ -965,7 +970,7 @@
           <a:p>
             <a:fld id="{87DE6118-2437-4B30-8E3C-4D2BE6020583}" type="datetimeFigureOut">
               <a:rPr lang="en-US" dirty="0"/>
-              <a:t>11/22/19</a:t>
+              <a:t>12/2/19</a:t>
             </a:fld>
             <a:endParaRPr lang="en-US" dirty="0"/>
           </a:p>
@@ -1238,7 +1243,7 @@
             <a:fld id="{87DE6118-2437-4B30-8E3C-4D2BE6020583}" type="datetimeFigureOut">
               <a:rPr lang="en-US" dirty="0"/>
               <a:pPr/>
-              <a:t>11/22/19</a:t>
+              <a:t>12/2/19</a:t>
             </a:fld>
             <a:endParaRPr lang="en-US" dirty="0"/>
           </a:p>
@@ -1628,7 +1633,7 @@
           <a:p>
             <a:fld id="{87DE6118-2437-4B30-8E3C-4D2BE6020583}" type="datetimeFigureOut">
               <a:rPr lang="en-US" dirty="0"/>
-              <a:t>11/22/19</a:t>
+              <a:t>12/2/19</a:t>
             </a:fld>
             <a:endParaRPr lang="en-US" dirty="0"/>
           </a:p>
@@ -2100,7 +2105,7 @@
           <a:p>
             <a:fld id="{87DE6118-2437-4B30-8E3C-4D2BE6020583}" type="datetimeFigureOut">
               <a:rPr lang="en-US" dirty="0"/>
-              <a:t>11/22/19</a:t>
+              <a:t>12/2/19</a:t>
             </a:fld>
             <a:endParaRPr lang="en-US" dirty="0"/>
           </a:p>
@@ -2213,7 +2218,7 @@
           <a:p>
             <a:fld id="{87DE6118-2437-4B30-8E3C-4D2BE6020583}" type="datetimeFigureOut">
               <a:rPr lang="en-US" dirty="0"/>
-              <a:t>11/22/19</a:t>
+              <a:t>12/2/19</a:t>
             </a:fld>
             <a:endParaRPr lang="en-US" dirty="0"/>
           </a:p>
@@ -2303,7 +2308,7 @@
           <a:p>
             <a:fld id="{87DE6118-2437-4B30-8E3C-4D2BE6020583}" type="datetimeFigureOut">
               <a:rPr lang="en-US" dirty="0"/>
-              <a:t>11/22/19</a:t>
+              <a:t>12/2/19</a:t>
             </a:fld>
             <a:endParaRPr lang="en-US" dirty="0"/>
           </a:p>
@@ -2645,7 +2650,7 @@
             <a:fld id="{87DE6118-2437-4B30-8E3C-4D2BE6020583}" type="datetimeFigureOut">
               <a:rPr lang="en-US" dirty="0"/>
               <a:pPr/>
-              <a:t>11/22/19</a:t>
+              <a:t>12/2/19</a:t>
             </a:fld>
             <a:endParaRPr lang="en-US" dirty="0"/>
           </a:p>
@@ -3030,7 +3035,7 @@
             <a:fld id="{87DE6118-2437-4B30-8E3C-4D2BE6020583}" type="datetimeFigureOut">
               <a:rPr lang="en-US" dirty="0"/>
               <a:pPr/>
-              <a:t>11/22/19</a:t>
+              <a:t>12/2/19</a:t>
             </a:fld>
             <a:endParaRPr lang="en-US" dirty="0"/>
           </a:p>
@@ -3305,7 +3310,7 @@
             <a:fld id="{87DE6118-2437-4B30-8E3C-4D2BE6020583}" type="datetimeFigureOut">
               <a:rPr lang="en-US" dirty="0"/>
               <a:pPr/>
-              <a:t>11/22/19</a:t>
+              <a:t>12/2/19</a:t>
             </a:fld>
             <a:endParaRPr lang="en-US" dirty="0"/>
           </a:p>
@@ -4349,8 +4354,13 @@
           <a:p>
             <a:r>
               <a:rPr lang="en-US" dirty="0"/>
-              <a:t>Very people want to go to Staten Island </a:t>
-            </a:r>
+              <a:t>Very people want to go to </a:t>
+            </a:r>
+            <a:r>
+              <a:rPr lang="en-US"/>
+              <a:t>Staten Island</a:t>
+            </a:r>
+            <a:endParaRPr lang="en-US" dirty="0"/>
           </a:p>
         </p:txBody>
       </p:sp>

</xml_diff>